<commit_message>
versao inicial da release 0.11.0
</commit_message>
<xml_diff>
--- a/Arte/Apresentação1.pptx
+++ b/Arte/Apresentação1.pptx
@@ -104,6 +104,11 @@
       </a:defRPr>
     </a:lvl9pPr>
   </p:defaultTextStyle>
+  <p:extLst>
+    <p:ext uri="{EFAFB233-063F-42B5-8137-9DF3F51BA10A}">
+      <p15:sldGuideLst xmlns:p15="http://schemas.microsoft.com/office/powerpoint/2012/main"/>
+    </p:ext>
+  </p:extLst>
 </p:presentation>
 </file>
 
@@ -254,7 +259,7 @@
           <a:p>
             <a:fld id="{A6BF9926-02CA-8D44-A1BC-C9595CD2F031}" type="datetimeFigureOut">
               <a:rPr lang="pt-BR" smtClean="0"/>
-              <a:t>10/08/2021</a:t>
+              <a:t>11/08/2021</a:t>
             </a:fld>
             <a:endParaRPr lang="pt-BR"/>
           </a:p>
@@ -452,7 +457,7 @@
           <a:p>
             <a:fld id="{A6BF9926-02CA-8D44-A1BC-C9595CD2F031}" type="datetimeFigureOut">
               <a:rPr lang="pt-BR" smtClean="0"/>
-              <a:t>10/08/2021</a:t>
+              <a:t>11/08/2021</a:t>
             </a:fld>
             <a:endParaRPr lang="pt-BR"/>
           </a:p>
@@ -660,7 +665,7 @@
           <a:p>
             <a:fld id="{A6BF9926-02CA-8D44-A1BC-C9595CD2F031}" type="datetimeFigureOut">
               <a:rPr lang="pt-BR" smtClean="0"/>
-              <a:t>10/08/2021</a:t>
+              <a:t>11/08/2021</a:t>
             </a:fld>
             <a:endParaRPr lang="pt-BR"/>
           </a:p>
@@ -858,7 +863,7 @@
           <a:p>
             <a:fld id="{A6BF9926-02CA-8D44-A1BC-C9595CD2F031}" type="datetimeFigureOut">
               <a:rPr lang="pt-BR" smtClean="0"/>
-              <a:t>10/08/2021</a:t>
+              <a:t>11/08/2021</a:t>
             </a:fld>
             <a:endParaRPr lang="pt-BR"/>
           </a:p>
@@ -1133,7 +1138,7 @@
           <a:p>
             <a:fld id="{A6BF9926-02CA-8D44-A1BC-C9595CD2F031}" type="datetimeFigureOut">
               <a:rPr lang="pt-BR" smtClean="0"/>
-              <a:t>10/08/2021</a:t>
+              <a:t>11/08/2021</a:t>
             </a:fld>
             <a:endParaRPr lang="pt-BR"/>
           </a:p>
@@ -1398,7 +1403,7 @@
           <a:p>
             <a:fld id="{A6BF9926-02CA-8D44-A1BC-C9595CD2F031}" type="datetimeFigureOut">
               <a:rPr lang="pt-BR" smtClean="0"/>
-              <a:t>10/08/2021</a:t>
+              <a:t>11/08/2021</a:t>
             </a:fld>
             <a:endParaRPr lang="pt-BR"/>
           </a:p>
@@ -1810,7 +1815,7 @@
           <a:p>
             <a:fld id="{A6BF9926-02CA-8D44-A1BC-C9595CD2F031}" type="datetimeFigureOut">
               <a:rPr lang="pt-BR" smtClean="0"/>
-              <a:t>10/08/2021</a:t>
+              <a:t>11/08/2021</a:t>
             </a:fld>
             <a:endParaRPr lang="pt-BR"/>
           </a:p>
@@ -1951,7 +1956,7 @@
           <a:p>
             <a:fld id="{A6BF9926-02CA-8D44-A1BC-C9595CD2F031}" type="datetimeFigureOut">
               <a:rPr lang="pt-BR" smtClean="0"/>
-              <a:t>10/08/2021</a:t>
+              <a:t>11/08/2021</a:t>
             </a:fld>
             <a:endParaRPr lang="pt-BR"/>
           </a:p>
@@ -2064,7 +2069,7 @@
           <a:p>
             <a:fld id="{A6BF9926-02CA-8D44-A1BC-C9595CD2F031}" type="datetimeFigureOut">
               <a:rPr lang="pt-BR" smtClean="0"/>
-              <a:t>10/08/2021</a:t>
+              <a:t>11/08/2021</a:t>
             </a:fld>
             <a:endParaRPr lang="pt-BR"/>
           </a:p>
@@ -2375,7 +2380,7 @@
           <a:p>
             <a:fld id="{A6BF9926-02CA-8D44-A1BC-C9595CD2F031}" type="datetimeFigureOut">
               <a:rPr lang="pt-BR" smtClean="0"/>
-              <a:t>10/08/2021</a:t>
+              <a:t>11/08/2021</a:t>
             </a:fld>
             <a:endParaRPr lang="pt-BR"/>
           </a:p>
@@ -2663,7 +2668,7 @@
           <a:p>
             <a:fld id="{A6BF9926-02CA-8D44-A1BC-C9595CD2F031}" type="datetimeFigureOut">
               <a:rPr lang="pt-BR" smtClean="0"/>
-              <a:t>10/08/2021</a:t>
+              <a:t>11/08/2021</a:t>
             </a:fld>
             <a:endParaRPr lang="pt-BR"/>
           </a:p>
@@ -2904,7 +2909,7 @@
           <a:p>
             <a:fld id="{A6BF9926-02CA-8D44-A1BC-C9595CD2F031}" type="datetimeFigureOut">
               <a:rPr lang="pt-BR" smtClean="0"/>
-              <a:t>10/08/2021</a:t>
+              <a:t>11/08/2021</a:t>
             </a:fld>
             <a:endParaRPr lang="pt-BR"/>
           </a:p>
@@ -3321,256 +3326,204 @@
           <a:chExt cx="0" cy="0"/>
         </a:xfrm>
       </p:grpSpPr>
-      <p:sp>
-        <p:nvSpPr>
-          <p:cNvPr id="6" name="Oval 5">
-            <a:extLst>
-              <a:ext uri="{FF2B5EF4-FFF2-40B4-BE49-F238E27FC236}">
-                <a16:creationId xmlns:a16="http://schemas.microsoft.com/office/drawing/2014/main" id="{2C4C6D16-EA7B-9E49-AD31-E7E435176322}"/>
-              </a:ext>
-            </a:extLst>
-          </p:cNvPr>
-          <p:cNvSpPr/>
+      <p:grpSp>
+        <p:nvGrpSpPr>
+          <p:cNvPr id="3" name="Agrupar 2">
+            <a:extLst>
+              <a:ext uri="{FF2B5EF4-FFF2-40B4-BE49-F238E27FC236}">
+                <a16:creationId xmlns:a16="http://schemas.microsoft.com/office/drawing/2014/main" id="{E63D6C64-6F33-EC42-B0B1-38DA92BDC7F4}"/>
+              </a:ext>
+            </a:extLst>
+          </p:cNvPr>
+          <p:cNvGrpSpPr/>
           <p:nvPr/>
-        </p:nvSpPr>
-        <p:spPr>
+        </p:nvGrpSpPr>
+        <p:grpSpPr>
           <a:xfrm>
-            <a:off x="2402083" y="1689133"/>
-            <a:ext cx="525502" cy="534257"/>
+            <a:off x="2078610" y="1357440"/>
+            <a:ext cx="3644096" cy="2508727"/>
+            <a:chOff x="2078610" y="1357440"/>
+            <a:chExt cx="3659269" cy="2508727"/>
           </a:xfrm>
-          <a:prstGeom prst="ellipse">
-            <a:avLst/>
-          </a:prstGeom>
-          <a:gradFill flip="none" rotWithShape="1">
-            <a:gsLst>
-              <a:gs pos="0">
-                <a:schemeClr val="bg2">
-                  <a:lumMod val="50000"/>
-                  <a:tint val="66000"/>
-                  <a:satMod val="160000"/>
-                </a:schemeClr>
-              </a:gs>
-              <a:gs pos="50000">
-                <a:schemeClr val="bg2">
-                  <a:lumMod val="50000"/>
-                  <a:tint val="44500"/>
-                  <a:satMod val="160000"/>
-                </a:schemeClr>
-              </a:gs>
-              <a:gs pos="100000">
-                <a:schemeClr val="bg2">
-                  <a:lumMod val="50000"/>
-                  <a:tint val="23500"/>
-                  <a:satMod val="160000"/>
-                </a:schemeClr>
-              </a:gs>
-            </a:gsLst>
-            <a:path path="circle">
-              <a:fillToRect l="50000" t="50000" r="50000" b="50000"/>
-            </a:path>
-            <a:tileRect/>
-          </a:gradFill>
-          <a:ln>
+        </p:grpSpPr>
+        <p:sp>
+          <p:nvSpPr>
+            <p:cNvPr id="6" name="Oval 5">
+              <a:extLst>
+                <a:ext uri="{FF2B5EF4-FFF2-40B4-BE49-F238E27FC236}">
+                  <a16:creationId xmlns:a16="http://schemas.microsoft.com/office/drawing/2014/main" id="{2C4C6D16-EA7B-9E49-AD31-E7E435176322}"/>
+                </a:ext>
+              </a:extLst>
+            </p:cNvPr>
+            <p:cNvSpPr/>
+            <p:nvPr/>
+          </p:nvSpPr>
+          <p:spPr>
+            <a:xfrm>
+              <a:off x="3465833" y="2290883"/>
+              <a:ext cx="472062" cy="503688"/>
+            </a:xfrm>
+            <a:prstGeom prst="ellipse">
+              <a:avLst/>
+            </a:prstGeom>
+            <a:solidFill>
+              <a:schemeClr val="accent1"/>
+            </a:solidFill>
+            <a:ln>
+              <a:noFill/>
+            </a:ln>
+          </p:spPr>
+          <p:style>
+            <a:lnRef idx="2">
+              <a:schemeClr val="accent1">
+                <a:shade val="50000"/>
+              </a:schemeClr>
+            </a:lnRef>
+            <a:fillRef idx="1">
+              <a:schemeClr val="accent1"/>
+            </a:fillRef>
+            <a:effectRef idx="0">
+              <a:schemeClr val="accent1"/>
+            </a:effectRef>
+            <a:fontRef idx="minor">
+              <a:schemeClr val="lt1"/>
+            </a:fontRef>
+          </p:style>
+          <p:txBody>
+            <a:bodyPr rtlCol="0" anchor="ctr"/>
+            <a:lstStyle/>
+            <a:p>
+              <a:pPr algn="ctr"/>
+              <a:endParaRPr lang="pt-BR"/>
+            </a:p>
+          </p:txBody>
+        </p:sp>
+        <p:pic>
+          <p:nvPicPr>
+            <p:cNvPr id="5" name="Imagem 4">
+              <a:extLst>
+                <a:ext uri="{FF2B5EF4-FFF2-40B4-BE49-F238E27FC236}">
+                  <a16:creationId xmlns:a16="http://schemas.microsoft.com/office/drawing/2014/main" id="{8A4BEBCE-291E-5B49-8EF9-85867B375F02}"/>
+                </a:ext>
+              </a:extLst>
+            </p:cNvPr>
+            <p:cNvPicPr>
+              <a:picLocks noChangeAspect="1"/>
+            </p:cNvPicPr>
+            <p:nvPr/>
+          </p:nvPicPr>
+          <p:blipFill>
+            <a:blip r:embed="rId2"/>
+            <a:stretch>
+              <a:fillRect/>
+            </a:stretch>
+          </p:blipFill>
+          <p:spPr>
+            <a:xfrm>
+              <a:off x="3795169" y="1357440"/>
+              <a:ext cx="1149650" cy="1437131"/>
+            </a:xfrm>
+            <a:prstGeom prst="rect">
+              <a:avLst/>
+            </a:prstGeom>
+          </p:spPr>
+        </p:pic>
+        <p:sp>
+          <p:nvSpPr>
+            <p:cNvPr id="7" name="CaixaDeTexto 6">
+              <a:extLst>
+                <a:ext uri="{FF2B5EF4-FFF2-40B4-BE49-F238E27FC236}">
+                  <a16:creationId xmlns:a16="http://schemas.microsoft.com/office/drawing/2014/main" id="{3C18A145-5E87-CB4E-9EA6-A53014F8913F}"/>
+                </a:ext>
+              </a:extLst>
+            </p:cNvPr>
+            <p:cNvSpPr txBox="1"/>
+            <p:nvPr/>
+          </p:nvSpPr>
+          <p:spPr>
+            <a:xfrm>
+              <a:off x="2078610" y="1774285"/>
+              <a:ext cx="1477969" cy="1323440"/>
+            </a:xfrm>
+            <a:prstGeom prst="rect">
+              <a:avLst/>
+            </a:prstGeom>
             <a:noFill/>
-          </a:ln>
-        </p:spPr>
-        <p:style>
-          <a:lnRef idx="2">
-            <a:schemeClr val="accent1">
-              <a:shade val="50000"/>
-            </a:schemeClr>
-          </a:lnRef>
-          <a:fillRef idx="1">
-            <a:schemeClr val="accent1"/>
-          </a:fillRef>
-          <a:effectRef idx="0">
-            <a:schemeClr val="accent1"/>
-          </a:effectRef>
-          <a:fontRef idx="minor">
-            <a:schemeClr val="lt1"/>
-          </a:fontRef>
-        </p:style>
-        <p:txBody>
-          <a:bodyPr rtlCol="0" anchor="ctr"/>
-          <a:lstStyle/>
-          <a:p>
-            <a:pPr algn="ctr"/>
-            <a:endParaRPr lang="pt-BR"/>
-          </a:p>
-        </p:txBody>
-      </p:sp>
-      <p:pic>
-        <p:nvPicPr>
-          <p:cNvPr id="1028" name="Picture 4" descr="Audit Ou Recherche Fiscale Ou Liste De Pages Papier Via Cartoon Plat Icône  Loupe Vector | Vecteur Premium">
-            <a:extLst>
-              <a:ext uri="{FF2B5EF4-FFF2-40B4-BE49-F238E27FC236}">
-                <a16:creationId xmlns:a16="http://schemas.microsoft.com/office/drawing/2014/main" id="{06D5E98E-3D82-2A44-B754-5C49E65FD3F0}"/>
-              </a:ext>
-            </a:extLst>
-          </p:cNvPr>
-          <p:cNvPicPr>
-            <a:picLocks noChangeAspect="1" noChangeArrowheads="1"/>
-          </p:cNvPicPr>
-          <p:nvPr/>
-        </p:nvPicPr>
-        <p:blipFill>
-          <a:blip r:embed="rId2">
-            <a:extLst>
-              <a:ext uri="{28A0092B-C50C-407E-A947-70E740481C1C}">
-                <a14:useLocalDpi xmlns:a14="http://schemas.microsoft.com/office/drawing/2010/main" val="0"/>
-              </a:ext>
-            </a:extLst>
-          </a:blip>
-          <a:srcRect/>
-          <a:stretch>
-            <a:fillRect/>
-          </a:stretch>
-        </p:blipFill>
-        <p:spPr bwMode="auto">
-          <a:xfrm>
-            <a:off x="8830781" y="-402262"/>
-            <a:ext cx="2409147" cy="2409147"/>
-          </a:xfrm>
-          <a:prstGeom prst="rect">
-            <a:avLst/>
-          </a:prstGeom>
-          <a:noFill/>
-          <a:extLst>
-            <a:ext uri="{909E8E84-426E-40DD-AFC4-6F175D3DCCD1}">
-              <a14:hiddenFill xmlns:a14="http://schemas.microsoft.com/office/drawing/2010/main">
+            <a:ln>
+              <a:noFill/>
+            </a:ln>
+          </p:spPr>
+          <p:txBody>
+            <a:bodyPr wrap="none" rtlCol="0">
+              <a:spAutoFit/>
+            </a:bodyPr>
+            <a:lstStyle/>
+            <a:p>
+              <a:r>
+                <a:rPr lang="pt-BR" sz="8000" dirty="0" err="1">
+                  <a:solidFill>
+                    <a:schemeClr val="accent1"/>
+                  </a:solidFill>
+                </a:rPr>
+                <a:t>Far</a:t>
+              </a:r>
+              <a:endParaRPr lang="pt-BR" sz="8000" dirty="0">
                 <a:solidFill>
-                  <a:srgbClr val="FFFFFF"/>
+                  <a:schemeClr val="accent1"/>
                 </a:solidFill>
-              </a14:hiddenFill>
-            </a:ext>
-          </a:extLst>
-        </p:spPr>
-      </p:pic>
-      <p:pic>
-        <p:nvPicPr>
-          <p:cNvPr id="5" name="Imagem 4">
-            <a:extLst>
-              <a:ext uri="{FF2B5EF4-FFF2-40B4-BE49-F238E27FC236}">
-                <a16:creationId xmlns:a16="http://schemas.microsoft.com/office/drawing/2014/main" id="{8A4BEBCE-291E-5B49-8EF9-85867B375F02}"/>
-              </a:ext>
-            </a:extLst>
-          </p:cNvPr>
-          <p:cNvPicPr>
-            <a:picLocks noChangeAspect="1"/>
-          </p:cNvPicPr>
-          <p:nvPr/>
-        </p:nvPicPr>
-        <p:blipFill>
-          <a:blip r:embed="rId3"/>
-          <a:stretch>
-            <a:fillRect/>
-          </a:stretch>
-        </p:blipFill>
-        <p:spPr>
-          <a:xfrm>
-            <a:off x="2402082" y="1512151"/>
-            <a:ext cx="613709" cy="682330"/>
-          </a:xfrm>
-          <a:prstGeom prst="rect">
-            <a:avLst/>
-          </a:prstGeom>
-        </p:spPr>
-      </p:pic>
-      <p:sp>
-        <p:nvSpPr>
-          <p:cNvPr id="7" name="CaixaDeTexto 6">
-            <a:extLst>
-              <a:ext uri="{FF2B5EF4-FFF2-40B4-BE49-F238E27FC236}">
-                <a16:creationId xmlns:a16="http://schemas.microsoft.com/office/drawing/2014/main" id="{3C18A145-5E87-CB4E-9EA6-A53014F8913F}"/>
-              </a:ext>
-            </a:extLst>
-          </p:cNvPr>
-          <p:cNvSpPr txBox="1"/>
-          <p:nvPr/>
-        </p:nvSpPr>
-        <p:spPr>
-          <a:xfrm>
-            <a:off x="1046110" y="1191597"/>
-            <a:ext cx="1477969" cy="1323439"/>
-          </a:xfrm>
-          <a:prstGeom prst="rect">
-            <a:avLst/>
-          </a:prstGeom>
-          <a:noFill/>
-          <a:ln>
+              </a:endParaRPr>
+            </a:p>
+          </p:txBody>
+        </p:sp>
+        <p:sp>
+          <p:nvSpPr>
+            <p:cNvPr id="10" name="CaixaDeTexto 9">
+              <a:extLst>
+                <a:ext uri="{FF2B5EF4-FFF2-40B4-BE49-F238E27FC236}">
+                  <a16:creationId xmlns:a16="http://schemas.microsoft.com/office/drawing/2014/main" id="{9290A67E-E757-CB44-9F46-8EE3F2745792}"/>
+                </a:ext>
+              </a:extLst>
+            </p:cNvPr>
+            <p:cNvSpPr txBox="1"/>
+            <p:nvPr/>
+          </p:nvSpPr>
+          <p:spPr>
+            <a:xfrm>
+              <a:off x="3227244" y="2542728"/>
+              <a:ext cx="2510635" cy="1323439"/>
+            </a:xfrm>
+            <a:prstGeom prst="rect">
+              <a:avLst/>
+            </a:prstGeom>
             <a:noFill/>
-          </a:ln>
-        </p:spPr>
-        <p:txBody>
-          <a:bodyPr wrap="none" rtlCol="0">
-            <a:spAutoFit/>
-          </a:bodyPr>
-          <a:lstStyle/>
-          <a:p>
-            <a:r>
-              <a:rPr lang="pt-BR" sz="8000" dirty="0" err="1">
-                <a:solidFill>
-                  <a:schemeClr val="accent3"/>
-                </a:solidFill>
-              </a:rPr>
-              <a:t>Far</a:t>
-            </a:r>
-            <a:endParaRPr lang="pt-BR" sz="8000" dirty="0">
-              <a:solidFill>
-                <a:schemeClr val="accent3"/>
-              </a:solidFill>
-            </a:endParaRPr>
-          </a:p>
-        </p:txBody>
-      </p:sp>
-      <p:sp>
-        <p:nvSpPr>
-          <p:cNvPr id="10" name="CaixaDeTexto 9">
-            <a:extLst>
-              <a:ext uri="{FF2B5EF4-FFF2-40B4-BE49-F238E27FC236}">
-                <a16:creationId xmlns:a16="http://schemas.microsoft.com/office/drawing/2014/main" id="{9290A67E-E757-CB44-9F46-8EE3F2745792}"/>
-              </a:ext>
-            </a:extLst>
-          </p:cNvPr>
-          <p:cNvSpPr txBox="1"/>
-          <p:nvPr/>
-        </p:nvSpPr>
-        <p:spPr>
-          <a:xfrm>
-            <a:off x="2829923" y="1512151"/>
-            <a:ext cx="2100255" cy="1323439"/>
-          </a:xfrm>
-          <a:prstGeom prst="rect">
-            <a:avLst/>
-          </a:prstGeom>
-          <a:noFill/>
-        </p:spPr>
-        <p:txBody>
-          <a:bodyPr wrap="none" rtlCol="0">
-            <a:spAutoFit/>
-          </a:bodyPr>
-          <a:lstStyle/>
-          <a:p>
-            <a:r>
-              <a:rPr lang="pt-BR" sz="8000" dirty="0" err="1">
+          </p:spPr>
+          <p:txBody>
+            <a:bodyPr wrap="square" rtlCol="0">
+              <a:spAutoFit/>
+            </a:bodyPr>
+            <a:lstStyle/>
+            <a:p>
+              <a:r>
+                <a:rPr lang="pt-BR" sz="8000" dirty="0" err="1">
+                  <a:solidFill>
+                    <a:schemeClr val="accent5">
+                      <a:lumMod val="75000"/>
+                    </a:schemeClr>
+                  </a:solidFill>
+                </a:rPr>
+                <a:t>docs</a:t>
+              </a:r>
+              <a:endParaRPr lang="pt-BR" sz="8000" dirty="0">
                 <a:solidFill>
                   <a:schemeClr val="accent5">
                     <a:lumMod val="75000"/>
                   </a:schemeClr>
                 </a:solidFill>
-              </a:rPr>
-              <a:t>docs</a:t>
-            </a:r>
-            <a:endParaRPr lang="pt-BR" sz="8000" dirty="0">
-              <a:solidFill>
-                <a:schemeClr val="accent5">
-                  <a:lumMod val="75000"/>
-                </a:schemeClr>
-              </a:solidFill>
-            </a:endParaRPr>
-          </a:p>
-        </p:txBody>
-      </p:sp>
+              </a:endParaRPr>
+            </a:p>
+          </p:txBody>
+        </p:sp>
+      </p:grpSp>
     </p:spTree>
     <p:extLst>
       <p:ext uri="{BB962C8B-B14F-4D97-AF65-F5344CB8AC3E}">

</xml_diff>